<commit_message>
Added thesis latex template and modified some little things
</commit_message>
<xml_diff>
--- a/thoh/毕业论文/答辩.pptx
+++ b/thoh/毕业论文/答辩.pptx
@@ -218,7 +218,7 @@
           <a:p>
             <a:fld id="{31AEA78D-4160-3544-B091-3C60111496EF}" type="datetimeFigureOut">
               <a:rPr kumimoji="1" lang="zh-CN" altLang="en-US" smtClean="0"/>
-              <a:t>2017/5/14</a:t>
+              <a:t>2017/5/20</a:t>
             </a:fld>
             <a:endParaRPr kumimoji="1" lang="zh-CN" altLang="en-US"/>
           </a:p>
@@ -675,7 +675,7 @@
             <a:fld id="{B61BEF0D-F0BB-DE4B-95CE-6DB70DBA9567}" type="datetimeFigureOut">
               <a:rPr lang="en-US" dirty="0"/>
               <a:pPr/>
-              <a:t>5/14/17</a:t>
+              <a:t>5/20/17</a:t>
             </a:fld>
             <a:endParaRPr lang="en-US" dirty="0"/>
           </a:p>
@@ -1010,7 +1010,7 @@
             <a:fld id="{B61BEF0D-F0BB-DE4B-95CE-6DB70DBA9567}" type="datetimeFigureOut">
               <a:rPr lang="en-US" dirty="0"/>
               <a:pPr/>
-              <a:t>5/14/17</a:t>
+              <a:t>5/20/17</a:t>
             </a:fld>
             <a:endParaRPr lang="en-US" dirty="0"/>
           </a:p>
@@ -1408,7 +1408,7 @@
             <a:fld id="{B61BEF0D-F0BB-DE4B-95CE-6DB70DBA9567}" type="datetimeFigureOut">
               <a:rPr lang="en-US" dirty="0"/>
               <a:pPr/>
-              <a:t>5/14/17</a:t>
+              <a:t>5/20/17</a:t>
             </a:fld>
             <a:endParaRPr lang="en-US" dirty="0"/>
           </a:p>
@@ -1741,7 +1741,7 @@
             <a:fld id="{B61BEF0D-F0BB-DE4B-95CE-6DB70DBA9567}" type="datetimeFigureOut">
               <a:rPr lang="en-US" dirty="0"/>
               <a:pPr/>
-              <a:t>5/14/17</a:t>
+              <a:t>5/20/17</a:t>
             </a:fld>
             <a:endParaRPr lang="en-US" dirty="0"/>
           </a:p>
@@ -2058,7 +2058,7 @@
             <a:fld id="{B61BEF0D-F0BB-DE4B-95CE-6DB70DBA9567}" type="datetimeFigureOut">
               <a:rPr lang="en-US" dirty="0"/>
               <a:pPr/>
-              <a:t>5/14/17</a:t>
+              <a:t>5/20/17</a:t>
             </a:fld>
             <a:endParaRPr lang="en-US" dirty="0"/>
           </a:p>
@@ -2451,7 +2451,7 @@
             <a:fld id="{B61BEF0D-F0BB-DE4B-95CE-6DB70DBA9567}" type="datetimeFigureOut">
               <a:rPr lang="en-US" dirty="0"/>
               <a:pPr/>
-              <a:t>5/14/17</a:t>
+              <a:t>5/20/17</a:t>
             </a:fld>
             <a:endParaRPr lang="en-US" dirty="0"/>
           </a:p>
@@ -2705,7 +2705,7 @@
             <a:fld id="{B61BEF0D-F0BB-DE4B-95CE-6DB70DBA9567}" type="datetimeFigureOut">
               <a:rPr lang="en-US" dirty="0"/>
               <a:pPr/>
-              <a:t>5/14/17</a:t>
+              <a:t>5/20/17</a:t>
             </a:fld>
             <a:endParaRPr lang="en-US" dirty="0"/>
           </a:p>
@@ -2964,7 +2964,7 @@
             <a:fld id="{B61BEF0D-F0BB-DE4B-95CE-6DB70DBA9567}" type="datetimeFigureOut">
               <a:rPr lang="en-US" dirty="0"/>
               <a:pPr/>
-              <a:t>5/14/17</a:t>
+              <a:t>5/20/17</a:t>
             </a:fld>
             <a:endParaRPr lang="en-US" dirty="0"/>
           </a:p>
@@ -3223,7 +3223,7 @@
             <a:fld id="{B61BEF0D-F0BB-DE4B-95CE-6DB70DBA9567}" type="datetimeFigureOut">
               <a:rPr lang="en-US" dirty="0"/>
               <a:pPr/>
-              <a:t>5/14/17</a:t>
+              <a:t>5/20/17</a:t>
             </a:fld>
             <a:endParaRPr lang="en-US" dirty="0"/>
           </a:p>
@@ -3549,7 +3549,7 @@
             <a:fld id="{B61BEF0D-F0BB-DE4B-95CE-6DB70DBA9567}" type="datetimeFigureOut">
               <a:rPr lang="en-US" dirty="0"/>
               <a:pPr/>
-              <a:t>5/14/17</a:t>
+              <a:t>5/20/17</a:t>
             </a:fld>
             <a:endParaRPr lang="en-US" dirty="0"/>
           </a:p>
@@ -3869,7 +3869,7 @@
             <a:fld id="{B61BEF0D-F0BB-DE4B-95CE-6DB70DBA9567}" type="datetimeFigureOut">
               <a:rPr lang="en-US" dirty="0"/>
               <a:pPr/>
-              <a:t>5/14/17</a:t>
+              <a:t>5/20/17</a:t>
             </a:fld>
             <a:endParaRPr lang="en-US" dirty="0"/>
           </a:p>
@@ -4323,7 +4323,7 @@
             <a:fld id="{B61BEF0D-F0BB-DE4B-95CE-6DB70DBA9567}" type="datetimeFigureOut">
               <a:rPr lang="en-US" dirty="0"/>
               <a:pPr/>
-              <a:t>5/14/17</a:t>
+              <a:t>5/20/17</a:t>
             </a:fld>
             <a:endParaRPr lang="en-US" dirty="0"/>
           </a:p>
@@ -4525,7 +4525,7 @@
             <a:fld id="{B61BEF0D-F0BB-DE4B-95CE-6DB70DBA9567}" type="datetimeFigureOut">
               <a:rPr lang="en-US" dirty="0"/>
               <a:pPr/>
-              <a:t>5/14/17</a:t>
+              <a:t>5/20/17</a:t>
             </a:fld>
             <a:endParaRPr lang="en-US" dirty="0"/>
           </a:p>
@@ -4699,7 +4699,7 @@
             <a:fld id="{B61BEF0D-F0BB-DE4B-95CE-6DB70DBA9567}" type="datetimeFigureOut">
               <a:rPr lang="en-US" dirty="0"/>
               <a:pPr/>
-              <a:t>5/14/17</a:t>
+              <a:t>5/20/17</a:t>
             </a:fld>
             <a:endParaRPr lang="en-US" dirty="0"/>
           </a:p>
@@ -5029,7 +5029,7 @@
             <a:fld id="{B61BEF0D-F0BB-DE4B-95CE-6DB70DBA9567}" type="datetimeFigureOut">
               <a:rPr lang="en-US" dirty="0"/>
               <a:pPr/>
-              <a:t>5/14/17</a:t>
+              <a:t>5/20/17</a:t>
             </a:fld>
             <a:endParaRPr lang="en-US" dirty="0"/>
           </a:p>
@@ -5371,7 +5371,7 @@
             <a:fld id="{B61BEF0D-F0BB-DE4B-95CE-6DB70DBA9567}" type="datetimeFigureOut">
               <a:rPr lang="en-US" dirty="0"/>
               <a:pPr/>
-              <a:t>5/14/17</a:t>
+              <a:t>5/20/17</a:t>
             </a:fld>
             <a:endParaRPr lang="en-US" dirty="0"/>
           </a:p>
@@ -7485,7 +7485,7 @@
             <a:fld id="{B61BEF0D-F0BB-DE4B-95CE-6DB70DBA9567}" type="datetimeFigureOut">
               <a:rPr lang="en-US" dirty="0"/>
               <a:pPr/>
-              <a:t>5/14/17</a:t>
+              <a:t>5/20/17</a:t>
             </a:fld>
             <a:endParaRPr lang="en-US" dirty="0"/>
           </a:p>
@@ -8022,7 +8022,23 @@
                 <a:ea typeface="Microsoft YaHei" charset="-122"/>
                 <a:cs typeface="Microsoft YaHei" charset="-122"/>
               </a:rPr>
-              <a:t>An OpenCL approach of data cube generation &amp; calculation</a:t>
+              <a:t>An OpenCL approach </a:t>
+            </a:r>
+            <a:r>
+              <a:rPr kumimoji="1" lang="en-US" altLang="zh-CN" dirty="0" smtClean="0">
+                <a:latin typeface="Microsoft YaHei" charset="-122"/>
+                <a:ea typeface="Microsoft YaHei" charset="-122"/>
+                <a:cs typeface="Microsoft YaHei" charset="-122"/>
+              </a:rPr>
+              <a:t>and its optimization of </a:t>
+            </a:r>
+            <a:r>
+              <a:rPr kumimoji="1" lang="en-US" altLang="zh-CN" dirty="0" smtClean="0">
+                <a:latin typeface="Microsoft YaHei" charset="-122"/>
+                <a:ea typeface="Microsoft YaHei" charset="-122"/>
+                <a:cs typeface="Microsoft YaHei" charset="-122"/>
+              </a:rPr>
+              <a:t>data cube generation &amp; calculation</a:t>
             </a:r>
             <a:endParaRPr kumimoji="1" lang="zh-CN" altLang="en-US" dirty="0">
               <a:latin typeface="Microsoft YaHei" charset="-122"/>
@@ -15626,11 +15642,7 @@
           <a:p>
             <a:r>
               <a:rPr kumimoji="1" lang="en-US" altLang="zh-CN" dirty="0" smtClean="0"/>
-              <a:t>1990s: Many researches focus on </a:t>
-            </a:r>
-            <a:r>
-              <a:rPr kumimoji="1" lang="en-US" altLang="zh-CN" dirty="0" smtClean="0"/>
-              <a:t>”How to calculate OLAP faster” </a:t>
+              <a:t>1990s: Many researches focus on ”How to calculate OLAP faster” </a:t>
             </a:r>
             <a:r>
               <a:rPr kumimoji="1" lang="en-US" altLang="zh-CN" dirty="0" smtClean="0">

</xml_diff>